<commit_message>
removed local path dependency
</commit_message>
<xml_diff>
--- a/FlaskWebProject1/static/test.pptx
+++ b/FlaskWebProject1/static/test.pptx
@@ -8,17 +8,6 @@
     <p:sldId r:id="rId7" id="256"/>
     <p:sldId r:id="rId8" id="257"/>
     <p:sldId r:id="rId9" id="258"/>
-    <p:sldId r:id="rId10" id="259"/>
-    <p:sldId r:id="rId11" id="260"/>
-    <p:sldId r:id="rId12" id="261"/>
-    <p:sldId r:id="rId13" id="262"/>
-    <p:sldId r:id="rId14" id="263"/>
-    <p:sldId r:id="rId15" id="264"/>
-    <p:sldId r:id="rId16" id="265"/>
-    <p:sldId r:id="rId17" id="266"/>
-    <p:sldId r:id="rId18" id="267"/>
-    <p:sldId r:id="rId19" id="268"/>
-    <p:sldId r:id="rId20" id="269"/>
   </p:sldIdLst>
   <p:sldSz cx="9144000" cy="6858000" type="screen4x3"/>
   <p:notesSz cx="6858000" cy="9144000"/>
@@ -3117,7 +3106,7 @@
           <a:lstStyle/>
           <a:p>
             <a:r>
-              <a:t>At WeWork, an Idealistic Start-Up Clashes With Its Cleaners</a:t>
+              <a:t>Twitter to Cut More Than 300 Jobs</a:t>
             </a:r>
           </a:p>
         </p:txBody>
@@ -3160,295 +3149,13 @@
         <p:spPr>
           <a:xfrm>
             <a:off x="2743200" y="4572000"/>
-            <a:ext cx="3491345" cy="1828800"/>
+            <a:ext cx="3497705" cy="1828800"/>
           </a:xfrm>
           <a:prstGeom prst="rect">
             <a:avLst/>
           </a:prstGeom>
         </p:spPr>
       </p:pic>
-    </p:spTree>
-  </p:cSld>
-  <p:clrMapOvr>
-    <a:masterClrMapping/>
-  </p:clrMapOvr>
-</p:sld>
-</file>
-
-<file path=ppt/slides/slide10.xml><?xml version="1.0" encoding="utf-8"?>
-<p:sld xmlns:a="http://schemas.openxmlformats.org/drawingml/2006/main" xmlns:p="http://schemas.openxmlformats.org/presentationml/2006/main" xmlns:r="http://schemas.openxmlformats.org/officeDocument/2006/relationships">
-  <p:cSld>
-    <p:spTree>
-      <p:nvGrpSpPr>
-        <p:cNvPr id="1" name=""/>
-        <p:cNvGrpSpPr/>
-        <p:nvPr/>
-      </p:nvGrpSpPr>
-      <p:grpSpPr/>
-      <p:sp>
-        <p:nvSpPr>
-          <p:cNvPr id="2" name="Title 1"/>
-          <p:cNvSpPr>
-            <a:spLocks noGrp="1"/>
-          </p:cNvSpPr>
-          <p:nvPr>
-            <p:ph type="title"/>
-          </p:nvPr>
-        </p:nvSpPr>
-        <p:spPr/>
-        <p:txBody>
-          <a:bodyPr/>
-          <a:lstStyle/>
-          <a:p/>
-        </p:txBody>
-      </p:sp>
-      <p:sp>
-        <p:nvSpPr>
-          <p:cNvPr id="3" name="Content Placeholder 2"/>
-          <p:cNvSpPr>
-            <a:spLocks noGrp="1"/>
-          </p:cNvSpPr>
-          <p:nvPr>
-            <p:ph idx="1"/>
-          </p:nvPr>
-        </p:nvSpPr>
-        <p:spPr/>
-        <p:txBody>
-          <a:bodyPr/>
-          <a:lstStyle/>
-          <a:p>
-            <a:r>
-              <a:t>” CBM terminated its contract with WeWork.</a:t>
-            </a:r>
-          </a:p>
-        </p:txBody>
-      </p:sp>
-    </p:spTree>
-  </p:cSld>
-  <p:clrMapOvr>
-    <a:masterClrMapping/>
-  </p:clrMapOvr>
-</p:sld>
-</file>
-
-<file path=ppt/slides/slide11.xml><?xml version="1.0" encoding="utf-8"?>
-<p:sld xmlns:a="http://schemas.openxmlformats.org/drawingml/2006/main" xmlns:p="http://schemas.openxmlformats.org/presentationml/2006/main" xmlns:r="http://schemas.openxmlformats.org/officeDocument/2006/relationships">
-  <p:cSld>
-    <p:spTree>
-      <p:nvGrpSpPr>
-        <p:cNvPr id="1" name=""/>
-        <p:cNvGrpSpPr/>
-        <p:nvPr/>
-      </p:nvGrpSpPr>
-      <p:grpSpPr/>
-      <p:sp>
-        <p:nvSpPr>
-          <p:cNvPr id="2" name="Title 1"/>
-          <p:cNvSpPr>
-            <a:spLocks noGrp="1"/>
-          </p:cNvSpPr>
-          <p:nvPr>
-            <p:ph type="title"/>
-          </p:nvPr>
-        </p:nvSpPr>
-        <p:spPr/>
-        <p:txBody>
-          <a:bodyPr/>
-          <a:lstStyle/>
-          <a:p/>
-        </p:txBody>
-      </p:sp>
-      <p:sp>
-        <p:nvSpPr>
-          <p:cNvPr id="3" name="Content Placeholder 2"/>
-          <p:cNvSpPr>
-            <a:spLocks noGrp="1"/>
-          </p:cNvSpPr>
-          <p:nvPr>
-            <p:ph idx="1"/>
-          </p:nvPr>
-        </p:nvSpPr>
-        <p:spPr/>
-        <p:txBody>
-          <a:bodyPr/>
-          <a:lstStyle/>
-          <a:p>
-            <a:r>
-              <a:t>WeWork said that it asked CBM to waive that restriction, but that CBM initially declined.</a:t>
-            </a:r>
-          </a:p>
-        </p:txBody>
-      </p:sp>
-    </p:spTree>
-  </p:cSld>
-  <p:clrMapOvr>
-    <a:masterClrMapping/>
-  </p:clrMapOvr>
-</p:sld>
-</file>
-
-<file path=ppt/slides/slide12.xml><?xml version="1.0" encoding="utf-8"?>
-<p:sld xmlns:a="http://schemas.openxmlformats.org/drawingml/2006/main" xmlns:p="http://schemas.openxmlformats.org/presentationml/2006/main" xmlns:r="http://schemas.openxmlformats.org/officeDocument/2006/relationships">
-  <p:cSld>
-    <p:spTree>
-      <p:nvGrpSpPr>
-        <p:cNvPr id="1" name=""/>
-        <p:cNvGrpSpPr/>
-        <p:nvPr/>
-      </p:nvGrpSpPr>
-      <p:grpSpPr/>
-      <p:sp>
-        <p:nvSpPr>
-          <p:cNvPr id="2" name="Title 1"/>
-          <p:cNvSpPr>
-            <a:spLocks noGrp="1"/>
-          </p:cNvSpPr>
-          <p:nvPr>
-            <p:ph type="title"/>
-          </p:nvPr>
-        </p:nvSpPr>
-        <p:spPr/>
-        <p:txBody>
-          <a:bodyPr/>
-          <a:lstStyle/>
-          <a:p/>
-        </p:txBody>
-      </p:sp>
-      <p:sp>
-        <p:nvSpPr>
-          <p:cNvPr id="3" name="Content Placeholder 2"/>
-          <p:cNvSpPr>
-            <a:spLocks noGrp="1"/>
-          </p:cNvSpPr>
-          <p:nvPr>
-            <p:ph idx="1"/>
-          </p:nvPr>
-        </p:nvSpPr>
-        <p:spPr/>
-        <p:txBody>
-          <a:bodyPr/>
-          <a:lstStyle/>
-          <a:p>
-            <a:r>
-              <a:t>The local Service Employees International Union chapter, which has been working with the former WeWork cleaners, contends that WeWork intentionally avoided hiring former CBM workers so it could prevent pro-union cleaners from joining the company and trying to organize.</a:t>
-            </a:r>
-          </a:p>
-        </p:txBody>
-      </p:sp>
-    </p:spTree>
-  </p:cSld>
-  <p:clrMapOvr>
-    <a:masterClrMapping/>
-  </p:clrMapOvr>
-</p:sld>
-</file>
-
-<file path=ppt/slides/slide13.xml><?xml version="1.0" encoding="utf-8"?>
-<p:sld xmlns:a="http://schemas.openxmlformats.org/drawingml/2006/main" xmlns:p="http://schemas.openxmlformats.org/presentationml/2006/main" xmlns:r="http://schemas.openxmlformats.org/officeDocument/2006/relationships">
-  <p:cSld>
-    <p:spTree>
-      <p:nvGrpSpPr>
-        <p:cNvPr id="1" name=""/>
-        <p:cNvGrpSpPr/>
-        <p:nvPr/>
-      </p:nvGrpSpPr>
-      <p:grpSpPr/>
-      <p:sp>
-        <p:nvSpPr>
-          <p:cNvPr id="2" name="Title 1"/>
-          <p:cNvSpPr>
-            <a:spLocks noGrp="1"/>
-          </p:cNvSpPr>
-          <p:nvPr>
-            <p:ph type="title"/>
-          </p:nvPr>
-        </p:nvSpPr>
-        <p:spPr/>
-        <p:txBody>
-          <a:bodyPr/>
-          <a:lstStyle/>
-          <a:p/>
-        </p:txBody>
-      </p:sp>
-      <p:sp>
-        <p:nvSpPr>
-          <p:cNvPr id="3" name="Content Placeholder 2"/>
-          <p:cNvSpPr>
-            <a:spLocks noGrp="1"/>
-          </p:cNvSpPr>
-          <p:nvPr>
-            <p:ph idx="1"/>
-          </p:nvPr>
-        </p:nvSpPr>
-        <p:spPr/>
-        <p:txBody>
-          <a:bodyPr/>
-          <a:lstStyle/>
-          <a:p>
-            <a:r>
-              <a:t>More than 500 WeWork members signed a petition demanding that the company hire the former CBM cleaners as community service associates.</a:t>
-            </a:r>
-          </a:p>
-        </p:txBody>
-      </p:sp>
-    </p:spTree>
-  </p:cSld>
-  <p:clrMapOvr>
-    <a:masterClrMapping/>
-  </p:clrMapOvr>
-</p:sld>
-</file>
-
-<file path=ppt/slides/slide14.xml><?xml version="1.0" encoding="utf-8"?>
-<p:sld xmlns:a="http://schemas.openxmlformats.org/drawingml/2006/main" xmlns:p="http://schemas.openxmlformats.org/presentationml/2006/main" xmlns:r="http://schemas.openxmlformats.org/officeDocument/2006/relationships">
-  <p:cSld>
-    <p:spTree>
-      <p:nvGrpSpPr>
-        <p:cNvPr id="1" name=""/>
-        <p:cNvGrpSpPr/>
-        <p:nvPr/>
-      </p:nvGrpSpPr>
-      <p:grpSpPr/>
-      <p:sp>
-        <p:nvSpPr>
-          <p:cNvPr id="2" name="TextBox 1"/>
-          <p:cNvSpPr txBox="1"/>
-          <p:nvPr/>
-        </p:nvSpPr>
-        <p:spPr>
-          <a:xfrm>
-            <a:off x="3657600" y="1828800"/>
-            <a:ext cx="3657600" cy="2286000"/>
-          </a:xfrm>
-          <a:prstGeom prst="rect">
-            <a:avLst/>
-          </a:prstGeom>
-          <a:noFill/>
-        </p:spPr>
-        <p:txBody>
-          <a:bodyPr wrap="none">
-            <a:spAutoFit/>
-          </a:bodyPr>
-          <a:lstStyle/>
-          <a:p/>
-          <a:p>
-            <a:pPr>
-              <a:defRPr b="1" sz="5000"/>
-            </a:pPr>
-            <a:r>
-              <a:t>The End</a:t>
-            </a:r>
-          </a:p>
-          <a:p>
-            <a:pPr>
-              <a:defRPr sz="3000"/>
-            </a:pPr>
-            <a:r>
-              <a:t>  Thank You</a:t>
-            </a:r>
-          </a:p>
-        </p:txBody>
-      </p:sp>
     </p:spTree>
   </p:cSld>
   <p:clrMapOvr>
@@ -3500,7 +3207,7 @@
           <a:lstStyle/>
           <a:p>
             <a:r>
-              <a:t>When the New York City cleaners — who made about $10 an hour and received no benefits or paid time off — tried to unionize in June, CBM terminated its contract with WeWork and eliminated the jobs.</a:t>
+              <a:t>Twitter announced on Tuesday that it was laying off as many as 336 employees, or 8 percent of its work force, to streamline and refocus as it tries to find ways to attract new users to its social network.</a:t>
             </a:r>
           </a:p>
         </p:txBody>
@@ -3525,374 +3232,40 @@
       <p:grpSpPr/>
       <p:sp>
         <p:nvSpPr>
-          <p:cNvPr id="2" name="Title 1"/>
-          <p:cNvSpPr>
-            <a:spLocks noGrp="1"/>
-          </p:cNvSpPr>
-          <p:nvPr>
-            <p:ph type="title"/>
-          </p:nvPr>
-        </p:nvSpPr>
-        <p:spPr/>
-        <p:txBody>
-          <a:bodyPr/>
+          <p:cNvPr id="2" name="TextBox 1"/>
+          <p:cNvSpPr txBox="1"/>
+          <p:nvPr/>
+        </p:nvSpPr>
+        <p:spPr>
+          <a:xfrm>
+            <a:off x="3657600" y="1828800"/>
+            <a:ext cx="3657600" cy="2286000"/>
+          </a:xfrm>
+          <a:prstGeom prst="rect">
+            <a:avLst/>
+          </a:prstGeom>
+          <a:noFill/>
+        </p:spPr>
+        <p:txBody>
+          <a:bodyPr wrap="none">
+            <a:spAutoFit/>
+          </a:bodyPr>
           <a:lstStyle/>
           <a:p/>
-        </p:txBody>
-      </p:sp>
-      <p:sp>
-        <p:nvSpPr>
-          <p:cNvPr id="3" name="Content Placeholder 2"/>
-          <p:cNvSpPr>
-            <a:spLocks noGrp="1"/>
-          </p:cNvSpPr>
-          <p:nvPr>
-            <p:ph idx="1"/>
-          </p:nvPr>
-        </p:nvSpPr>
-        <p:spPr/>
-        <p:txBody>
-          <a:bodyPr/>
-          <a:lstStyle/>
-          <a:p>
-            <a:r>
-              <a:t>WeWork decided to hire its own in-house cleaning staff but will not hire all the former CBM workers, leaving about 100 people jobless.</a:t>
-            </a:r>
-          </a:p>
-        </p:txBody>
-      </p:sp>
-    </p:spTree>
-  </p:cSld>
-  <p:clrMapOvr>
-    <a:masterClrMapping/>
-  </p:clrMapOvr>
-</p:sld>
-</file>
-
-<file path=ppt/slides/slide4.xml><?xml version="1.0" encoding="utf-8"?>
-<p:sld xmlns:a="http://schemas.openxmlformats.org/drawingml/2006/main" xmlns:p="http://schemas.openxmlformats.org/presentationml/2006/main" xmlns:r="http://schemas.openxmlformats.org/officeDocument/2006/relationships">
-  <p:cSld>
-    <p:spTree>
-      <p:nvGrpSpPr>
-        <p:cNvPr id="1" name=""/>
-        <p:cNvGrpSpPr/>
-        <p:nvPr/>
-      </p:nvGrpSpPr>
-      <p:grpSpPr/>
-      <p:sp>
-        <p:nvSpPr>
-          <p:cNvPr id="2" name="Title 1"/>
-          <p:cNvSpPr>
-            <a:spLocks noGrp="1"/>
-          </p:cNvSpPr>
-          <p:nvPr>
-            <p:ph type="title"/>
-          </p:nvPr>
-        </p:nvSpPr>
-        <p:spPr/>
-        <p:txBody>
-          <a:bodyPr/>
-          <a:lstStyle/>
-          <a:p/>
-        </p:txBody>
-      </p:sp>
-      <p:sp>
-        <p:nvSpPr>
-          <p:cNvPr id="3" name="Content Placeholder 2"/>
-          <p:cNvSpPr>
-            <a:spLocks noGrp="1"/>
-          </p:cNvSpPr>
-          <p:nvPr>
-            <p:ph idx="1"/>
-          </p:nvPr>
-        </p:nvSpPr>
-        <p:spPr/>
-        <p:txBody>
-          <a:bodyPr/>
-          <a:lstStyle/>
-          <a:p>
-            <a:r>
-              <a:t>The cleaners said they had worn WeWork T-shirts, gotten to know the company’s staff and customers, and believed WeWork had a responsibility to them.</a:t>
-            </a:r>
-          </a:p>
-        </p:txBody>
-      </p:sp>
-    </p:spTree>
-  </p:cSld>
-  <p:clrMapOvr>
-    <a:masterClrMapping/>
-  </p:clrMapOvr>
-</p:sld>
-</file>
-
-<file path=ppt/slides/slide5.xml><?xml version="1.0" encoding="utf-8"?>
-<p:sld xmlns:a="http://schemas.openxmlformats.org/drawingml/2006/main" xmlns:p="http://schemas.openxmlformats.org/presentationml/2006/main" xmlns:r="http://schemas.openxmlformats.org/officeDocument/2006/relationships">
-  <p:cSld>
-    <p:spTree>
-      <p:nvGrpSpPr>
-        <p:cNvPr id="1" name=""/>
-        <p:cNvGrpSpPr/>
-        <p:nvPr/>
-      </p:nvGrpSpPr>
-      <p:grpSpPr/>
-      <p:sp>
-        <p:nvSpPr>
-          <p:cNvPr id="2" name="Title 1"/>
-          <p:cNvSpPr>
-            <a:spLocks noGrp="1"/>
-          </p:cNvSpPr>
-          <p:nvPr>
-            <p:ph type="title"/>
-          </p:nvPr>
-        </p:nvSpPr>
-        <p:spPr/>
-        <p:txBody>
-          <a:bodyPr/>
-          <a:lstStyle/>
-          <a:p/>
-        </p:txBody>
-      </p:sp>
-      <p:sp>
-        <p:nvSpPr>
-          <p:cNvPr id="3" name="Content Placeholder 2"/>
-          <p:cNvSpPr>
-            <a:spLocks noGrp="1"/>
-          </p:cNvSpPr>
-          <p:nvPr>
-            <p:ph idx="1"/>
-          </p:nvPr>
-        </p:nvSpPr>
-        <p:spPr/>
-        <p:txBody>
-          <a:bodyPr/>
-          <a:lstStyle/>
-          <a:p>
-            <a:r>
-              <a:t>Neumann explained that WeWork was now hiring its own cleaners, paying them $15 to $18 an hour, and offering health care along with equity in the company.</a:t>
-            </a:r>
-          </a:p>
-        </p:txBody>
-      </p:sp>
-    </p:spTree>
-  </p:cSld>
-  <p:clrMapOvr>
-    <a:masterClrMapping/>
-  </p:clrMapOvr>
-</p:sld>
-</file>
-
-<file path=ppt/slides/slide6.xml><?xml version="1.0" encoding="utf-8"?>
-<p:sld xmlns:a="http://schemas.openxmlformats.org/drawingml/2006/main" xmlns:p="http://schemas.openxmlformats.org/presentationml/2006/main" xmlns:r="http://schemas.openxmlformats.org/officeDocument/2006/relationships">
-  <p:cSld>
-    <p:spTree>
-      <p:nvGrpSpPr>
-        <p:cNvPr id="1" name=""/>
-        <p:cNvGrpSpPr/>
-        <p:nvPr/>
-      </p:nvGrpSpPr>
-      <p:grpSpPr/>
-      <p:sp>
-        <p:nvSpPr>
-          <p:cNvPr id="2" name="Title 1"/>
-          <p:cNvSpPr>
-            <a:spLocks noGrp="1"/>
-          </p:cNvSpPr>
-          <p:nvPr>
-            <p:ph type="title"/>
-          </p:nvPr>
-        </p:nvSpPr>
-        <p:spPr/>
-        <p:txBody>
-          <a:bodyPr/>
-          <a:lstStyle/>
-          <a:p/>
-        </p:txBody>
-      </p:sp>
-      <p:sp>
-        <p:nvSpPr>
-          <p:cNvPr id="3" name="Content Placeholder 2"/>
-          <p:cNvSpPr>
-            <a:spLocks noGrp="1"/>
-          </p:cNvSpPr>
-          <p:nvPr>
-            <p:ph idx="1"/>
-          </p:nvPr>
-        </p:nvSpPr>
-        <p:spPr/>
-        <p:txBody>
-          <a:bodyPr/>
-          <a:lstStyle/>
-          <a:p>
-            <a:r>
-              <a:t>“When I asked WeWork for more money, they told me to talk to CBM,” he said.</a:t>
-            </a:r>
-          </a:p>
-        </p:txBody>
-      </p:sp>
-    </p:spTree>
-  </p:cSld>
-  <p:clrMapOvr>
-    <a:masterClrMapping/>
-  </p:clrMapOvr>
-</p:sld>
-</file>
-
-<file path=ppt/slides/slide7.xml><?xml version="1.0" encoding="utf-8"?>
-<p:sld xmlns:a="http://schemas.openxmlformats.org/drawingml/2006/main" xmlns:p="http://schemas.openxmlformats.org/presentationml/2006/main" xmlns:r="http://schemas.openxmlformats.org/officeDocument/2006/relationships">
-  <p:cSld>
-    <p:spTree>
-      <p:nvGrpSpPr>
-        <p:cNvPr id="1" name=""/>
-        <p:cNvGrpSpPr/>
-        <p:nvPr/>
-      </p:nvGrpSpPr>
-      <p:grpSpPr/>
-      <p:sp>
-        <p:nvSpPr>
-          <p:cNvPr id="2" name="Title 1"/>
-          <p:cNvSpPr>
-            <a:spLocks noGrp="1"/>
-          </p:cNvSpPr>
-          <p:nvPr>
-            <p:ph type="title"/>
-          </p:nvPr>
-        </p:nvSpPr>
-        <p:spPr/>
-        <p:txBody>
-          <a:bodyPr/>
-          <a:lstStyle/>
-          <a:p/>
-        </p:txBody>
-      </p:sp>
-      <p:sp>
-        <p:nvSpPr>
-          <p:cNvPr id="3" name="Content Placeholder 2"/>
-          <p:cNvSpPr>
-            <a:spLocks noGrp="1"/>
-          </p:cNvSpPr>
-          <p:nvPr>
-            <p:ph idx="1"/>
-          </p:nvPr>
-        </p:nvSpPr>
-        <p:spPr/>
-        <p:txBody>
-          <a:bodyPr/>
-          <a:lstStyle/>
-          <a:p>
-            <a:r>
-              <a:t>“When I asked CBM for more money, CBM said WeWork had to approve the raise.</a:t>
-            </a:r>
-          </a:p>
-        </p:txBody>
-      </p:sp>
-    </p:spTree>
-  </p:cSld>
-  <p:clrMapOvr>
-    <a:masterClrMapping/>
-  </p:clrMapOvr>
-</p:sld>
-</file>
-
-<file path=ppt/slides/slide8.xml><?xml version="1.0" encoding="utf-8"?>
-<p:sld xmlns:a="http://schemas.openxmlformats.org/drawingml/2006/main" xmlns:p="http://schemas.openxmlformats.org/presentationml/2006/main" xmlns:r="http://schemas.openxmlformats.org/officeDocument/2006/relationships">
-  <p:cSld>
-    <p:spTree>
-      <p:nvGrpSpPr>
-        <p:cNvPr id="1" name=""/>
-        <p:cNvGrpSpPr/>
-        <p:nvPr/>
-      </p:nvGrpSpPr>
-      <p:grpSpPr/>
-      <p:sp>
-        <p:nvSpPr>
-          <p:cNvPr id="2" name="Title 1"/>
-          <p:cNvSpPr>
-            <a:spLocks noGrp="1"/>
-          </p:cNvSpPr>
-          <p:nvPr>
-            <p:ph type="title"/>
-          </p:nvPr>
-        </p:nvSpPr>
-        <p:spPr/>
-        <p:txBody>
-          <a:bodyPr/>
-          <a:lstStyle/>
-          <a:p/>
-        </p:txBody>
-      </p:sp>
-      <p:sp>
-        <p:nvSpPr>
-          <p:cNvPr id="3" name="Content Placeholder 2"/>
-          <p:cNvSpPr>
-            <a:spLocks noGrp="1"/>
-          </p:cNvSpPr>
-          <p:nvPr>
-            <p:ph idx="1"/>
-          </p:nvPr>
-        </p:nvSpPr>
-        <p:spPr/>
-        <p:txBody>
-          <a:bodyPr/>
-          <a:lstStyle/>
-          <a:p>
-            <a:r>
-              <a:t>But for now, a company like WeWork has no obligations to look out for the employees of a contractor like CBM.</a:t>
-            </a:r>
-          </a:p>
-        </p:txBody>
-      </p:sp>
-    </p:spTree>
-  </p:cSld>
-  <p:clrMapOvr>
-    <a:masterClrMapping/>
-  </p:clrMapOvr>
-</p:sld>
-</file>
-
-<file path=ppt/slides/slide9.xml><?xml version="1.0" encoding="utf-8"?>
-<p:sld xmlns:a="http://schemas.openxmlformats.org/drawingml/2006/main" xmlns:p="http://schemas.openxmlformats.org/presentationml/2006/main" xmlns:r="http://schemas.openxmlformats.org/officeDocument/2006/relationships">
-  <p:cSld>
-    <p:spTree>
-      <p:nvGrpSpPr>
-        <p:cNvPr id="1" name=""/>
-        <p:cNvGrpSpPr/>
-        <p:nvPr/>
-      </p:nvGrpSpPr>
-      <p:grpSpPr/>
-      <p:sp>
-        <p:nvSpPr>
-          <p:cNvPr id="2" name="Title 1"/>
-          <p:cNvSpPr>
-            <a:spLocks noGrp="1"/>
-          </p:cNvSpPr>
-          <p:nvPr>
-            <p:ph type="title"/>
-          </p:nvPr>
-        </p:nvSpPr>
-        <p:spPr/>
-        <p:txBody>
-          <a:bodyPr/>
-          <a:lstStyle/>
-          <a:p/>
-        </p:txBody>
-      </p:sp>
-      <p:sp>
-        <p:nvSpPr>
-          <p:cNvPr id="3" name="Content Placeholder 2"/>
-          <p:cNvSpPr>
-            <a:spLocks noGrp="1"/>
-          </p:cNvSpPr>
-          <p:nvPr>
-            <p:ph idx="1"/>
-          </p:nvPr>
-        </p:nvSpPr>
-        <p:spPr/>
-        <p:txBody>
-          <a:bodyPr/>
-          <a:lstStyle/>
-          <a:p>
-            <a:r>
-              <a:t>When they began organizing this summer, CBM asked WeWork to change its contract in order to pay the cleaners higher wages and allow them to join a union — though a union of CBM’s choosing.</a:t>
+          <a:p>
+            <a:pPr>
+              <a:defRPr b="1" sz="5000"/>
+            </a:pPr>
+            <a:r>
+              <a:t>The End</a:t>
+            </a:r>
+          </a:p>
+          <a:p>
+            <a:pPr>
+              <a:defRPr sz="3000"/>
+            </a:pPr>
+            <a:r>
+              <a:t>  Thank You</a:t>
             </a:r>
           </a:p>
         </p:txBody>

</xml_diff>